<commit_message>
Added changes in Oslo and dotnet pptx
</commit_message>
<xml_diff>
--- a/presentations/Oslo/TechEd - Codename Oslo.pptx
+++ b/presentations/Oslo/TechEd - Codename Oslo.pptx
@@ -223,7 +223,7 @@
                 <a:latin typeface="Calibri" pitchFamily="34" charset="0"/>
               </a:rPr>
               <a:pPr/>
-              <a:t>10/7/2008</a:t>
+              <a:t>10/11/2008</a:t>
             </a:fld>
             <a:endParaRPr lang="en-US" dirty="0">
               <a:latin typeface="Calibri" pitchFamily="34" charset="0"/>
@@ -431,7 +431,7 @@
             <a:fld id="{7C3FBCD4-166E-446F-AF18-7D4A0CF9AEF6}" type="datetimeFigureOut">
               <a:rPr lang="en-US" smtClean="0"/>
               <a:pPr/>
-              <a:t>10/7/2008</a:t>
+              <a:t>10/11/2008</a:t>
             </a:fld>
             <a:endParaRPr lang="en-US" dirty="0"/>
           </a:p>
@@ -830,7 +830,7 @@
             <a:fld id="{81331B57-0BE5-4F82-AA58-76F53EFF3ADA}" type="datetime8">
               <a:rPr lang="en-US" smtClean="0"/>
               <a:pPr/>
-              <a:t>10/7/2008 12:18 PM</a:t>
+              <a:t>10/11/2008 9:03 AM</a:t>
             </a:fld>
             <a:endParaRPr lang="en-US" dirty="0"/>
           </a:p>
@@ -1237,7 +1237,7 @@
             <a:fld id="{81331B57-0BE5-4F82-AA58-76F53EFF3ADA}" type="datetime8">
               <a:rPr lang="en-US" smtClean="0"/>
               <a:pPr/>
-              <a:t>10/7/2008 12:18 PM</a:t>
+              <a:t>10/11/2008 9:03 AM</a:t>
             </a:fld>
             <a:endParaRPr lang="en-US" dirty="0"/>
           </a:p>
@@ -1405,7 +1405,7 @@
             <a:fld id="{81331B57-0BE5-4F82-AA58-76F53EFF3ADA}" type="datetime8">
               <a:rPr lang="en-US" smtClean="0"/>
               <a:pPr/>
-              <a:t>10/7/2008 12:19 PM</a:t>
+              <a:t>10/11/2008 9:03 AM</a:t>
             </a:fld>
             <a:endParaRPr lang="en-US"/>
           </a:p>
@@ -24080,23 +24080,6 @@
               <a:t>Andersson</a:t>
             </a:r>
             <a:endParaRPr lang="en-US" dirty="0" smtClean="0"/>
-          </a:p>
-          <a:p>
-            <a:r>
-              <a:rPr lang="en-US" dirty="0" smtClean="0"/>
-              <a:t>Stefan Nilsson</a:t>
-            </a:r>
-          </a:p>
-          <a:p>
-            <a:r>
-              <a:rPr lang="en-US" dirty="0" smtClean="0"/>
-              <a:t>Peter </a:t>
-            </a:r>
-            <a:r>
-              <a:rPr lang="en-US" dirty="0" err="1" smtClean="0"/>
-              <a:t>Nylander</a:t>
-            </a:r>
-            <a:endParaRPr lang="en-US" dirty="0"/>
           </a:p>
         </p:txBody>
       </p:sp>
@@ -28016,13 +27999,7 @@
               <a:rPr lang="en-US" sz="2000" dirty="0" smtClean="0">
                 <a:hlinkClick r:id="rId4"/>
               </a:rPr>
-              <a:t>http://douglaspurdy.com/2008/09/06/what-is-oslo</a:t>
-            </a:r>
-            <a:r>
-              <a:rPr lang="en-US" sz="2000" dirty="0" smtClean="0">
-                <a:hlinkClick r:id="rId4"/>
-              </a:rPr>
-              <a:t>/</a:t>
+              <a:t>http://douglaspurdy.com/2008/09/06/what-is-oslo/</a:t>
             </a:r>
             <a:r>
               <a:rPr lang="en-US" sz="2000" dirty="0" smtClean="0"/>
@@ -28067,13 +28044,7 @@
               <a:rPr lang="en-US" sz="2000" dirty="0" smtClean="0">
                 <a:hlinkClick r:id="rId5"/>
               </a:rPr>
-              <a:t>http://</a:t>
-            </a:r>
-            <a:r>
-              <a:rPr lang="en-US" sz="2000" dirty="0" smtClean="0">
-                <a:hlinkClick r:id="rId5"/>
-              </a:rPr>
-              <a:t>www.pluralsight.com/community/blogs/dbox/archive/2008/09/06/oslo.aspx</a:t>
+              <a:t>http://www.pluralsight.com/community/blogs/dbox/archive/2008/09/06/oslo.aspx</a:t>
             </a:r>
             <a:r>
               <a:rPr lang="en-US" sz="2000" dirty="0" smtClean="0"/>
@@ -28324,13 +28295,8 @@
           <a:p>
             <a:r>
               <a:rPr lang="en-US" sz="2800" dirty="0" smtClean="0"/>
-              <a:t>The "Oslo" technologies </a:t>
+              <a:t>The "Oslo" technologies as we know of today</a:t>
             </a:r>
-            <a:r>
-              <a:rPr lang="en-US" sz="2800" dirty="0" smtClean="0"/>
-              <a:t>as we know of today</a:t>
-            </a:r>
-            <a:endParaRPr lang="en-US" sz="2800" dirty="0" smtClean="0"/>
           </a:p>
           <a:p>
             <a:pPr lvl="1"/>
@@ -29263,13 +29229,8 @@
           <a:p>
             <a:r>
               <a:rPr lang="en-US" dirty="0" smtClean="0"/>
-              <a:t>What is </a:t>
+              <a:t>What is Oslo?</a:t>
             </a:r>
-            <a:r>
-              <a:rPr lang="en-US" dirty="0" smtClean="0"/>
-              <a:t>Oslo?</a:t>
-            </a:r>
-            <a:endParaRPr lang="en-US" dirty="0" smtClean="0"/>
           </a:p>
         </p:txBody>
       </p:sp>
@@ -29303,7 +29264,6 @@
               <a:rPr lang="sv-SE" sz="2800" dirty="0" smtClean="0"/>
               <a:t>A modeling platform</a:t>
             </a:r>
-            <a:endParaRPr lang="sv-SE" sz="2800" dirty="0" smtClean="0"/>
           </a:p>
           <a:p>
             <a:pPr lvl="1"/>
@@ -29311,7 +29271,6 @@
               <a:rPr lang="en-US" sz="2400" dirty="0" smtClean="0"/>
               <a:t>A tool that helps people define and interact with models in a rich and visual manner </a:t>
             </a:r>
-            <a:endParaRPr lang="en-US" sz="2400" dirty="0" smtClean="0"/>
           </a:p>
           <a:p>
             <a:pPr lvl="1"/>
@@ -29319,7 +29278,6 @@
               <a:rPr lang="en-US" sz="2400" dirty="0" smtClean="0"/>
               <a:t>A relational repository that makes models available to both tools and platform components</a:t>
             </a:r>
-            <a:endParaRPr lang="en-US" sz="2400" dirty="0" smtClean="0"/>
           </a:p>
           <a:p>
             <a:r>

</xml_diff>